<commit_message>
added new project edtach
</commit_message>
<xml_diff>
--- a/Customer_Engagement_Campaign_Performance_Analytics/Customer_Engagement_Campaign_Performance_Analytics_report.pptx
+++ b/Customer_Engagement_Campaign_Performance_Analytics/Customer_Engagement_Campaign_Performance_Analytics_report.pptx
@@ -573,7 +573,7 @@
             </a:ln>
             <a:extLst>
               <a:ext uri="{91240B29-F687-4f45-9708-019B960494DF}">
-                <a14:hiddenLine xmlns="" xmlns:a14="http://schemas.microsoft.com/office/drawing/2010/main" w="9525">
+                <a14:hiddenLine xmlns:a14="http://schemas.microsoft.com/office/drawing/2010/main" xmlns="" w="9525">
                   <a:solidFill>
                     <a:srgbClr val="000000"/>
                   </a:solidFill>
@@ -770,7 +770,7 @@
           <a:p>
             <a:fld id="{5BCAD085-E8A6-8845-BD4E-CB4CCA059FC4}" type="datetimeFigureOut">
               <a:rPr lang="en-US" smtClean="0"/>
-              <a:t>7/12/2025</a:t>
+              <a:t>8/1/2025</a:t>
             </a:fld>
             <a:endParaRPr lang="en-US"/>
           </a:p>
@@ -1654,7 +1654,7 @@
             </a:ln>
             <a:extLst>
               <a:ext uri="{91240B29-F687-4f45-9708-019B960494DF}">
-                <a14:hiddenLine xmlns="" xmlns:a14="http://schemas.microsoft.com/office/drawing/2010/main" w="9525">
+                <a14:hiddenLine xmlns:a14="http://schemas.microsoft.com/office/drawing/2010/main" xmlns="" w="9525">
                   <a:solidFill>
                     <a:srgbClr val="000000"/>
                   </a:solidFill>
@@ -1871,7 +1871,7 @@
           <a:p>
             <a:fld id="{5BCAD085-E8A6-8845-BD4E-CB4CCA059FC4}" type="datetimeFigureOut">
               <a:rPr lang="en-US" smtClean="0"/>
-              <a:t>7/12/2025</a:t>
+              <a:t>8/1/2025</a:t>
             </a:fld>
             <a:endParaRPr lang="en-US"/>
           </a:p>
@@ -2740,7 +2740,7 @@
             </a:ln>
             <a:extLst>
               <a:ext uri="{91240B29-F687-4f45-9708-019B960494DF}">
-                <a14:hiddenLine xmlns="" xmlns:a14="http://schemas.microsoft.com/office/drawing/2010/main" w="9525">
+                <a14:hiddenLine xmlns:a14="http://schemas.microsoft.com/office/drawing/2010/main" xmlns="" w="9525">
                   <a:solidFill>
                     <a:srgbClr val="000000"/>
                   </a:solidFill>
@@ -2869,7 +2869,7 @@
           <a:p>
             <a:fld id="{5BCAD085-E8A6-8845-BD4E-CB4CCA059FC4}" type="datetimeFigureOut">
               <a:rPr lang="en-US" smtClean="0"/>
-              <a:t>7/12/2025</a:t>
+              <a:t>8/1/2025</a:t>
             </a:fld>
             <a:endParaRPr lang="en-US"/>
           </a:p>
@@ -3701,7 +3701,7 @@
             </a:ln>
             <a:extLst>
               <a:ext uri="{91240B29-F687-4f45-9708-019B960494DF}">
-                <a14:hiddenLine xmlns="" xmlns:a14="http://schemas.microsoft.com/office/drawing/2010/main" w="9525">
+                <a14:hiddenLine xmlns:a14="http://schemas.microsoft.com/office/drawing/2010/main" xmlns="" w="9525">
                   <a:solidFill>
                     <a:srgbClr val="000000"/>
                   </a:solidFill>
@@ -3984,7 +3984,7 @@
           <a:p>
             <a:fld id="{5BCAD085-E8A6-8845-BD4E-CB4CCA059FC4}" type="datetimeFigureOut">
               <a:rPr lang="en-US" smtClean="0"/>
-              <a:t>7/12/2025</a:t>
+              <a:t>8/1/2025</a:t>
             </a:fld>
             <a:endParaRPr lang="en-US"/>
           </a:p>
@@ -4816,7 +4816,7 @@
             </a:ln>
             <a:extLst>
               <a:ext uri="{91240B29-F687-4f45-9708-019B960494DF}">
-                <a14:hiddenLine xmlns="" xmlns:a14="http://schemas.microsoft.com/office/drawing/2010/main" w="9525">
+                <a14:hiddenLine xmlns:a14="http://schemas.microsoft.com/office/drawing/2010/main" xmlns="" w="9525">
                   <a:solidFill>
                     <a:srgbClr val="000000"/>
                   </a:solidFill>
@@ -4998,7 +4998,7 @@
           <a:p>
             <a:fld id="{5BCAD085-E8A6-8845-BD4E-CB4CCA059FC4}" type="datetimeFigureOut">
               <a:rPr lang="en-US" smtClean="0"/>
-              <a:t>7/12/2025</a:t>
+              <a:t>8/1/2025</a:t>
             </a:fld>
             <a:endParaRPr lang="en-US"/>
           </a:p>
@@ -5670,7 +5670,7 @@
           <a:p>
             <a:fld id="{5BCAD085-E8A6-8845-BD4E-CB4CCA059FC4}" type="datetimeFigureOut">
               <a:rPr lang="en-US" smtClean="0"/>
-              <a:t>7/12/2025</a:t>
+              <a:t>8/1/2025</a:t>
             </a:fld>
             <a:endParaRPr lang="en-US"/>
           </a:p>
@@ -6543,7 +6543,7 @@
           <a:p>
             <a:fld id="{5BCAD085-E8A6-8845-BD4E-CB4CCA059FC4}" type="datetimeFigureOut">
               <a:rPr lang="en-US" smtClean="0"/>
-              <a:t>7/12/2025</a:t>
+              <a:t>8/1/2025</a:t>
             </a:fld>
             <a:endParaRPr lang="en-US"/>
           </a:p>
@@ -6730,7 +6730,7 @@
           <a:p>
             <a:fld id="{5BCAD085-E8A6-8845-BD4E-CB4CCA059FC4}" type="datetimeFigureOut">
               <a:rPr lang="en-US" smtClean="0"/>
-              <a:t>7/12/2025</a:t>
+              <a:t>8/1/2025</a:t>
             </a:fld>
             <a:endParaRPr lang="en-US"/>
           </a:p>
@@ -7565,7 +7565,7 @@
           </a:ln>
           <a:extLst>
             <a:ext uri="{91240B29-F687-4f45-9708-019B960494DF}">
-              <a14:hiddenLine xmlns="" xmlns:a14="http://schemas.microsoft.com/office/drawing/2010/main" w="9525">
+              <a14:hiddenLine xmlns:a14="http://schemas.microsoft.com/office/drawing/2010/main" xmlns="" w="9525">
                 <a:solidFill>
                   <a:srgbClr val="000000"/>
                 </a:solidFill>
@@ -7679,7 +7679,7 @@
           <a:p>
             <a:fld id="{5BCAD085-E8A6-8845-BD4E-CB4CCA059FC4}" type="datetimeFigureOut">
               <a:rPr lang="en-US" smtClean="0"/>
-              <a:t>7/12/2025</a:t>
+              <a:t>8/1/2025</a:t>
             </a:fld>
             <a:endParaRPr lang="en-US"/>
           </a:p>
@@ -7911,7 +7911,7 @@
           <a:p>
             <a:fld id="{5BCAD085-E8A6-8845-BD4E-CB4CCA059FC4}" type="datetimeFigureOut">
               <a:rPr lang="en-US" smtClean="0"/>
-              <a:t>7/12/2025</a:t>
+              <a:t>8/1/2025</a:t>
             </a:fld>
             <a:endParaRPr lang="en-US"/>
           </a:p>
@@ -8740,7 +8740,7 @@
             </a:ln>
             <a:extLst>
               <a:ext uri="{91240B29-F687-4f45-9708-019B960494DF}">
-                <a14:hiddenLine xmlns="" xmlns:a14="http://schemas.microsoft.com/office/drawing/2010/main" w="9525">
+                <a14:hiddenLine xmlns:a14="http://schemas.microsoft.com/office/drawing/2010/main" xmlns="" w="9525">
                   <a:solidFill>
                     <a:srgbClr val="000000"/>
                   </a:solidFill>
@@ -8922,7 +8922,7 @@
           <a:p>
             <a:fld id="{5BCAD085-E8A6-8845-BD4E-CB4CCA059FC4}" type="datetimeFigureOut">
               <a:rPr lang="en-US" smtClean="0"/>
-              <a:t>7/12/2025</a:t>
+              <a:t>8/1/2025</a:t>
             </a:fld>
             <a:endParaRPr lang="en-US"/>
           </a:p>
@@ -9206,7 +9206,7 @@
           <a:p>
             <a:fld id="{5BCAD085-E8A6-8845-BD4E-CB4CCA059FC4}" type="datetimeFigureOut">
               <a:rPr lang="en-US" smtClean="0"/>
-              <a:t>7/12/2025</a:t>
+              <a:t>8/1/2025</a:t>
             </a:fld>
             <a:endParaRPr lang="en-US"/>
           </a:p>
@@ -9606,7 +9606,7 @@
           <a:p>
             <a:fld id="{5BCAD085-E8A6-8845-BD4E-CB4CCA059FC4}" type="datetimeFigureOut">
               <a:rPr lang="en-US" smtClean="0"/>
-              <a:t>7/12/2025</a:t>
+              <a:t>8/1/2025</a:t>
             </a:fld>
             <a:endParaRPr lang="en-US"/>
           </a:p>
@@ -9736,7 +9736,7 @@
           <a:p>
             <a:fld id="{5BCAD085-E8A6-8845-BD4E-CB4CCA059FC4}" type="datetimeFigureOut">
               <a:rPr lang="en-US" smtClean="0"/>
-              <a:t>7/12/2025</a:t>
+              <a:t>8/1/2025</a:t>
             </a:fld>
             <a:endParaRPr lang="en-US"/>
           </a:p>
@@ -9879,7 +9879,7 @@
           <a:p>
             <a:fld id="{5BCAD085-E8A6-8845-BD4E-CB4CCA059FC4}" type="datetimeFigureOut">
               <a:rPr lang="en-US" smtClean="0"/>
-              <a:t>7/12/2025</a:t>
+              <a:t>8/1/2025</a:t>
             </a:fld>
             <a:endParaRPr lang="en-US"/>
           </a:p>
@@ -10708,7 +10708,7 @@
             </a:ln>
             <a:extLst>
               <a:ext uri="{91240B29-F687-4f45-9708-019B960494DF}">
-                <a14:hiddenLine xmlns="" xmlns:a14="http://schemas.microsoft.com/office/drawing/2010/main" w="9525">
+                <a14:hiddenLine xmlns:a14="http://schemas.microsoft.com/office/drawing/2010/main" xmlns="" w="9525">
                   <a:solidFill>
                     <a:srgbClr val="000000"/>
                   </a:solidFill>
@@ -10901,7 +10901,7 @@
           <a:p>
             <a:fld id="{5BCAD085-E8A6-8845-BD4E-CB4CCA059FC4}" type="datetimeFigureOut">
               <a:rPr lang="en-US" smtClean="0"/>
-              <a:t>7/12/2025</a:t>
+              <a:t>8/1/2025</a:t>
             </a:fld>
             <a:endParaRPr lang="en-US"/>
           </a:p>
@@ -11766,7 +11766,7 @@
             </a:ln>
             <a:extLst>
               <a:ext uri="{91240B29-F687-4f45-9708-019B960494DF}">
-                <a14:hiddenLine xmlns="" xmlns:a14="http://schemas.microsoft.com/office/drawing/2010/main" w="9525">
+                <a14:hiddenLine xmlns:a14="http://schemas.microsoft.com/office/drawing/2010/main" xmlns="" w="9525">
                   <a:solidFill>
                     <a:srgbClr val="000000"/>
                   </a:solidFill>
@@ -11983,7 +11983,7 @@
           <a:p>
             <a:fld id="{5BCAD085-E8A6-8845-BD4E-CB4CCA059FC4}" type="datetimeFigureOut">
               <a:rPr lang="en-US" smtClean="0"/>
-              <a:t>7/12/2025</a:t>
+              <a:t>8/1/2025</a:t>
             </a:fld>
             <a:endParaRPr lang="en-US"/>
           </a:p>
@@ -12816,7 +12816,7 @@
             </a:ln>
             <a:extLst>
               <a:ext uri="{91240B29-F687-4f45-9708-019B960494DF}">
-                <a14:hiddenLine xmlns="" xmlns:a14="http://schemas.microsoft.com/office/drawing/2010/main" w="9525">
+                <a14:hiddenLine xmlns:a14="http://schemas.microsoft.com/office/drawing/2010/main" xmlns="" w="9525">
                   <a:solidFill>
                     <a:srgbClr val="000000"/>
                   </a:solidFill>
@@ -12957,7 +12957,7 @@
           <a:p>
             <a:fld id="{5BCAD085-E8A6-8845-BD4E-CB4CCA059FC4}" type="datetimeFigureOut">
               <a:rPr lang="en-US" smtClean="0"/>
-              <a:t>7/12/2025</a:t>
+              <a:t>8/1/2025</a:t>
             </a:fld>
             <a:endParaRPr lang="en-US"/>
           </a:p>
@@ -13772,11 +13772,13 @@
           <a:lstStyle/>
           <a:p>
             <a:r>
+              <a:rPr dirty="0"/>
               <a:t>Top products by engagement: Surfboard (25.97%), Running Shoes (25.74%)</a:t>
             </a:r>
           </a:p>
           <a:p>
             <a:r>
+              <a:rPr dirty="0"/>
               <a:t>Helps identify high-interest products for promotion</a:t>
             </a:r>
           </a:p>
@@ -14280,33 +14282,42 @@
           <a:lstStyle/>
           <a:p>
             <a:r>
+              <a:rPr dirty="0"/>
               <a:t>Key Tables:</a:t>
             </a:r>
           </a:p>
           <a:p>
             <a:r>
-              <a:t>- Products</a:t>
-            </a:r>
-          </a:p>
-          <a:p>
-            <a:r>
-              <a:t>- Customers &amp; Countries</a:t>
-            </a:r>
-          </a:p>
-          <a:p>
-            <a:r>
-              <a:t>- Customer_journey</a:t>
-            </a:r>
-          </a:p>
-          <a:p>
-            <a:r>
-              <a:t>- Cust_review</a:t>
-            </a:r>
-          </a:p>
-          <a:p>
-            <a:r>
-              <a:t>- Engag_data</a:t>
-            </a:r>
+              <a:rPr dirty="0"/>
+              <a:t>Products</a:t>
+            </a:r>
+          </a:p>
+          <a:p>
+            <a:r>
+              <a:rPr dirty="0"/>
+              <a:t>Customers &amp; Countries</a:t>
+            </a:r>
+          </a:p>
+          <a:p>
+            <a:r>
+              <a:rPr dirty="0" err="1"/>
+              <a:t>Customer_journey</a:t>
+            </a:r>
+            <a:endParaRPr dirty="0"/>
+          </a:p>
+          <a:p>
+            <a:r>
+              <a:rPr dirty="0" err="1"/>
+              <a:t>Cust_review</a:t>
+            </a:r>
+            <a:endParaRPr dirty="0"/>
+          </a:p>
+          <a:p>
+            <a:r>
+              <a:rPr dirty="0" err="1"/>
+              <a:t>Engag_data</a:t>
+            </a:r>
+            <a:endParaRPr dirty="0"/>
           </a:p>
         </p:txBody>
       </p:sp>
@@ -14587,10 +14598,15 @@
             <p:ph idx="1"/>
           </p:nvPr>
         </p:nvSpPr>
-        <p:spPr/>
+        <p:spPr>
+          <a:xfrm>
+            <a:off x="864381" y="2177592"/>
+            <a:ext cx="7676303" cy="4680408"/>
+          </a:xfrm>
+        </p:spPr>
         <p:txBody>
           <a:bodyPr>
-            <a:normAutofit fontScale="47500" lnSpcReduction="20000"/>
+            <a:noAutofit/>
           </a:bodyPr>
           <a:lstStyle/>
           <a:p>
@@ -14598,85 +14614,88 @@
               <a:buNone/>
             </a:pPr>
             <a:r>
-              <a:rPr dirty="0"/>
-              <a:t>✅ Click-Through Rate (CTR)</a:t>
-            </a:r>
-          </a:p>
-          <a:p>
-            <a:r>
-              <a:rPr dirty="0"/>
+              <a:rPr sz="1050" dirty="0"/>
+              <a:t>Click-Through Rate (CTR)</a:t>
+            </a:r>
+          </a:p>
+          <a:p>
+            <a:r>
+              <a:rPr sz="1050" dirty="0"/>
               <a:t>Definition: Percentage of users who clicked on a campaign out of total who viewed it.</a:t>
             </a:r>
           </a:p>
           <a:p>
             <a:r>
-              <a:rPr dirty="0"/>
+              <a:rPr sz="1050" dirty="0"/>
               <a:t>Formula: CTR = (Total Clicks / Total Views) × 100</a:t>
             </a:r>
           </a:p>
           <a:p>
             <a:r>
-              <a:rPr dirty="0"/>
+              <a:rPr sz="1050" dirty="0"/>
               <a:t>Business Insight: A high CTR indicates the campaign content is compelling and effectively driving user interaction.</a:t>
             </a:r>
           </a:p>
           <a:p>
-            <a:endParaRPr dirty="0"/>
-          </a:p>
-          <a:p>
             <a:pPr marL="0" indent="0">
               <a:buNone/>
             </a:pPr>
-            <a:r>
-              <a:rPr dirty="0"/>
-              <a:t>✅ Conversion Rate</a:t>
-            </a:r>
-          </a:p>
-          <a:p>
-            <a:r>
-              <a:rPr dirty="0"/>
+            <a:endParaRPr lang="en-US" sz="1050" dirty="0"/>
+          </a:p>
+          <a:p>
+            <a:pPr marL="0" indent="0">
+              <a:buNone/>
+            </a:pPr>
+            <a:r>
+              <a:rPr sz="1050" dirty="0"/>
+              <a:t>Conversion Rate</a:t>
+            </a:r>
+          </a:p>
+          <a:p>
+            <a:r>
+              <a:rPr sz="1050" dirty="0"/>
               <a:t>Definition: Percentage of users who completed a purchase after viewing the campaign.</a:t>
             </a:r>
           </a:p>
           <a:p>
             <a:r>
-              <a:rPr dirty="0"/>
+              <a:rPr sz="1050" dirty="0"/>
               <a:t>Formula: Conversion Rate = (Total Purchases / Total Views) × 100</a:t>
             </a:r>
           </a:p>
           <a:p>
             <a:r>
-              <a:rPr dirty="0"/>
+              <a:rPr sz="1050" dirty="0"/>
               <a:t>Business Insight: Indicates how well the campaign turns interest into sales — a key measure of campaign effectiveness.</a:t>
             </a:r>
           </a:p>
           <a:p>
-            <a:endParaRPr dirty="0"/>
+            <a:endParaRPr sz="1050" dirty="0"/>
           </a:p>
           <a:p>
             <a:pPr marL="0" indent="0">
               <a:buNone/>
             </a:pPr>
             <a:r>
-              <a:rPr dirty="0"/>
-              <a:t>✅ Interaction Rate</a:t>
-            </a:r>
-          </a:p>
-          <a:p>
-            <a:r>
-              <a:rPr dirty="0"/>
+              <a:rPr sz="1050" dirty="0"/>
+              <a:t>Interaction Rate</a:t>
+            </a:r>
+          </a:p>
+          <a:p>
+            <a:r>
+              <a:rPr sz="1050" dirty="0"/>
               <a:t>Definition: Total engagement (likes + clicks) as a percentage of views.</a:t>
             </a:r>
           </a:p>
           <a:p>
             <a:r>
-              <a:rPr dirty="0"/>
+              <a:rPr sz="1050" dirty="0"/>
               <a:t>Formula: Interaction Rate = ((Likes + Clicks) / Views) × 100</a:t>
             </a:r>
           </a:p>
           <a:p>
             <a:r>
-              <a:rPr dirty="0"/>
+              <a:rPr sz="1050" dirty="0"/>
               <a:t>Business Insight: Reflects user interest and engagement level with the product or content.</a:t>
             </a:r>
           </a:p>
@@ -14744,16 +14763,19 @@
           <a:lstStyle/>
           <a:p>
             <a:r>
+              <a:rPr dirty="0"/>
               <a:t>Campaign 16: Highest CTR (21.38%)</a:t>
             </a:r>
           </a:p>
           <a:p>
             <a:r>
+              <a:rPr dirty="0"/>
               <a:t>Campaign 18: Highest Conversion Rate (5.11%)</a:t>
             </a:r>
           </a:p>
           <a:p>
             <a:r>
+              <a:rPr dirty="0"/>
               <a:t>Campaign 15 &amp; 19: Most Purchases (~990 each)</a:t>
             </a:r>
           </a:p>

</xml_diff>